<commit_message>
Modified mid-February standup meeting presentation.
</commit_message>
<xml_diff>
--- a/docs/Meetings/4/4.pptx
+++ b/docs/Meetings/4/4.pptx
@@ -13563,6 +13563,12 @@
               <a:t>Can we mock external APIs for our viva? The crypto and stock market APIs might go down or be slow during the presentation.</a:t>
             </a:r>
           </a:p>
+          <a:p>
+            <a:r>
+              <a:rPr lang="en-US" dirty="0"/>
+              <a:t>Were the sample high quality reports for previous final year projects unanimously chosen and deemed as good? What if the supervisor that marked one of the reports considered it to be a 1:1, but another would grade that same report a 2:1?</a:t>
+            </a:r>
+          </a:p>
         </p:txBody>
       </p:sp>
     </p:spTree>

</xml_diff>

<commit_message>
Designed the basic UI of the chat bot on the web app.
</commit_message>
<xml_diff>
--- a/docs/Meetings/4/4.pptx
+++ b/docs/Meetings/4/4.pptx
@@ -456,7 +456,7 @@
           <a:p>
             <a:fld id="{5930266A-47E2-AD46-80FA-AF9BB5BD36C8}" type="datetimeFigureOut">
               <a:rPr lang="en-US" smtClean="0"/>
-              <a:t>2/14/22</a:t>
+              <a:t>2/15/22</a:t>
             </a:fld>
             <a:endParaRPr lang="en-US"/>
           </a:p>
@@ -1544,7 +1544,7 @@
           <a:p>
             <a:fld id="{5930266A-47E2-AD46-80FA-AF9BB5BD36C8}" type="datetimeFigureOut">
               <a:rPr lang="en-US" smtClean="0"/>
-              <a:t>2/14/22</a:t>
+              <a:t>2/15/22</a:t>
             </a:fld>
             <a:endParaRPr lang="en-US"/>
           </a:p>
@@ -2524,7 +2524,7 @@
           <a:p>
             <a:fld id="{5930266A-47E2-AD46-80FA-AF9BB5BD36C8}" type="datetimeFigureOut">
               <a:rPr lang="en-US" smtClean="0"/>
-              <a:t>2/14/22</a:t>
+              <a:t>2/15/22</a:t>
             </a:fld>
             <a:endParaRPr lang="en-US"/>
           </a:p>
@@ -3658,7 +3658,7 @@
           <a:p>
             <a:fld id="{5930266A-47E2-AD46-80FA-AF9BB5BD36C8}" type="datetimeFigureOut">
               <a:rPr lang="en-US" smtClean="0"/>
-              <a:t>2/14/22</a:t>
+              <a:t>2/15/22</a:t>
             </a:fld>
             <a:endParaRPr lang="en-US"/>
           </a:p>
@@ -4691,7 +4691,7 @@
           <a:p>
             <a:fld id="{5930266A-47E2-AD46-80FA-AF9BB5BD36C8}" type="datetimeFigureOut">
               <a:rPr lang="en-US" smtClean="0"/>
-              <a:t>2/14/22</a:t>
+              <a:t>2/15/22</a:t>
             </a:fld>
             <a:endParaRPr lang="en-US"/>
           </a:p>
@@ -5351,7 +5351,7 @@
           <a:p>
             <a:fld id="{5930266A-47E2-AD46-80FA-AF9BB5BD36C8}" type="datetimeFigureOut">
               <a:rPr lang="en-US" smtClean="0"/>
-              <a:t>2/14/22</a:t>
+              <a:t>2/15/22</a:t>
             </a:fld>
             <a:endParaRPr lang="en-US"/>
           </a:p>
@@ -6212,7 +6212,7 @@
           <a:p>
             <a:fld id="{5930266A-47E2-AD46-80FA-AF9BB5BD36C8}" type="datetimeFigureOut">
               <a:rPr lang="en-US" smtClean="0"/>
-              <a:t>2/14/22</a:t>
+              <a:t>2/15/22</a:t>
             </a:fld>
             <a:endParaRPr lang="en-US"/>
           </a:p>
@@ -6402,7 +6402,7 @@
           <a:p>
             <a:fld id="{5930266A-47E2-AD46-80FA-AF9BB5BD36C8}" type="datetimeFigureOut">
               <a:rPr lang="en-US" smtClean="0"/>
-              <a:t>2/14/22</a:t>
+              <a:t>2/15/22</a:t>
             </a:fld>
             <a:endParaRPr lang="en-US"/>
           </a:p>
@@ -7374,7 +7374,7 @@
           <a:p>
             <a:fld id="{5930266A-47E2-AD46-80FA-AF9BB5BD36C8}" type="datetimeFigureOut">
               <a:rPr lang="en-US" smtClean="0"/>
-              <a:t>2/14/22</a:t>
+              <a:t>2/15/22</a:t>
             </a:fld>
             <a:endParaRPr lang="en-US"/>
           </a:p>
@@ -7585,7 +7585,7 @@
           <a:p>
             <a:fld id="{5930266A-47E2-AD46-80FA-AF9BB5BD36C8}" type="datetimeFigureOut">
               <a:rPr lang="en-US" smtClean="0"/>
-              <a:t>2/14/22</a:t>
+              <a:t>2/15/22</a:t>
             </a:fld>
             <a:endParaRPr lang="en-US"/>
           </a:p>
@@ -8619,7 +8619,7 @@
           <a:p>
             <a:fld id="{5930266A-47E2-AD46-80FA-AF9BB5BD36C8}" type="datetimeFigureOut">
               <a:rPr lang="en-US" smtClean="0"/>
-              <a:t>2/14/22</a:t>
+              <a:t>2/15/22</a:t>
             </a:fld>
             <a:endParaRPr lang="en-US"/>
           </a:p>
@@ -8891,7 +8891,7 @@
           <a:p>
             <a:fld id="{5930266A-47E2-AD46-80FA-AF9BB5BD36C8}" type="datetimeFigureOut">
               <a:rPr lang="en-US" smtClean="0"/>
-              <a:t>2/14/22</a:t>
+              <a:t>2/15/22</a:t>
             </a:fld>
             <a:endParaRPr lang="en-US"/>
           </a:p>
@@ -9301,7 +9301,7 @@
           <a:p>
             <a:fld id="{5930266A-47E2-AD46-80FA-AF9BB5BD36C8}" type="datetimeFigureOut">
               <a:rPr lang="en-US" smtClean="0"/>
-              <a:t>2/14/22</a:t>
+              <a:t>2/15/22</a:t>
             </a:fld>
             <a:endParaRPr lang="en-US"/>
           </a:p>
@@ -9428,7 +9428,7 @@
           <a:p>
             <a:fld id="{5930266A-47E2-AD46-80FA-AF9BB5BD36C8}" type="datetimeFigureOut">
               <a:rPr lang="en-US" smtClean="0"/>
-              <a:t>2/14/22</a:t>
+              <a:t>2/15/22</a:t>
             </a:fld>
             <a:endParaRPr lang="en-US"/>
           </a:p>
@@ -9523,7 +9523,7 @@
           <a:p>
             <a:fld id="{5930266A-47E2-AD46-80FA-AF9BB5BD36C8}" type="datetimeFigureOut">
               <a:rPr lang="en-US" smtClean="0"/>
-              <a:t>2/14/22</a:t>
+              <a:t>2/15/22</a:t>
             </a:fld>
             <a:endParaRPr lang="en-US"/>
           </a:p>
@@ -10604,7 +10604,7 @@
           <a:p>
             <a:fld id="{5930266A-47E2-AD46-80FA-AF9BB5BD36C8}" type="datetimeFigureOut">
               <a:rPr lang="en-US" smtClean="0"/>
-              <a:t>2/14/22</a:t>
+              <a:t>2/15/22</a:t>
             </a:fld>
             <a:endParaRPr lang="en-US"/>
           </a:p>
@@ -11712,7 +11712,7 @@
           <a:p>
             <a:fld id="{5930266A-47E2-AD46-80FA-AF9BB5BD36C8}" type="datetimeFigureOut">
               <a:rPr lang="en-US" smtClean="0"/>
-              <a:t>2/14/22</a:t>
+              <a:t>2/15/22</a:t>
             </a:fld>
             <a:endParaRPr lang="en-US"/>
           </a:p>
@@ -12709,7 +12709,7 @@
           <a:p>
             <a:fld id="{5930266A-47E2-AD46-80FA-AF9BB5BD36C8}" type="datetimeFigureOut">
               <a:rPr lang="en-US" smtClean="0"/>
-              <a:t>2/14/22</a:t>
+              <a:t>2/15/22</a:t>
             </a:fld>
             <a:endParaRPr lang="en-US"/>
           </a:p>
@@ -13672,7 +13672,7 @@
           <a:p>
             <a:r>
               <a:rPr lang="en-US" dirty="0"/>
-              <a:t>Investors would value the open-source nature, the mixture of stocks and cryptos, the ability to import/export user data securely and easily (based on a large amount of user feedback from the previous iteration of this software). </a:t>
+              <a:t>Investors would value the open-source nature, cross-platform functionality, the mixture of stocks and cryptos, the ability to import/export user data securely and easily (based on a large amount of user feedback from the previous iteration of this software). </a:t>
             </a:r>
           </a:p>
           <a:p>
@@ -13987,8 +13987,19 @@
         </p:nvSpPr>
         <p:spPr/>
         <p:txBody>
-          <a:bodyPr/>
+          <a:bodyPr>
+            <a:normAutofit lnSpcReduction="10000"/>
+          </a:bodyPr>
           <a:lstStyle/>
+          <a:p>
+            <a:pPr marL="0" indent="0">
+              <a:buNone/>
+            </a:pPr>
+            <a:r>
+              <a:rPr lang="en-GB" dirty="0"/>
+              <a:t>Currently, users can…</a:t>
+            </a:r>
+          </a:p>
           <a:p>
             <a:r>
               <a:rPr lang="en-GB" dirty="0"/>
@@ -14242,7 +14253,7 @@
           <a:p>
             <a:r>
               <a:rPr lang="en-GB" dirty="0"/>
-              <a:t>Budget income.</a:t>
+              <a:t>Budgeting system.</a:t>
             </a:r>
           </a:p>
           <a:p>

</xml_diff>